<commit_message>
I like to make corrections
</commit_message>
<xml_diff>
--- a/2021-Raffaele_Francesco_Barbagallo-COVID_19_Forecasting_GNN.pptx
+++ b/2021-Raffaele_Francesco_Barbagallo-COVID_19_Forecasting_GNN.pptx
@@ -11627,7 +11627,24 @@
             </a:r>
             <a:r>
               <a:rPr lang="en-US" sz="3200" dirty="0"/>
-              <a:t>: each node contains data about state, county, day, past cases and past deaths. </a:t>
+              <a:t>: each node contains data about state, county, day, past cases and past deaths.</a:t>
+            </a:r>
+            <a:br>
+              <a:rPr lang="en-US" sz="3200" dirty="0"/>
+            </a:br>
+            <a:r>
+              <a:rPr lang="en-US" sz="3200" dirty="0"/>
+              <a:t> </a:t>
+            </a:r>
+          </a:p>
+          <a:p>
+            <a:r>
+              <a:rPr lang="en-US" sz="3200" b="1" dirty="0"/>
+              <a:t>Community mobility reports: </a:t>
+            </a:r>
+            <a:r>
+              <a:rPr lang="en-US" sz="3200" dirty="0"/>
+              <a:t>trends at various categories of places aggregated at the county (node) level. </a:t>
             </a:r>
             <a:br>
               <a:rPr lang="en-US" sz="3200" dirty="0"/>
@@ -11643,23 +11660,6 @@
               <a:rPr lang="en-US" sz="3200" dirty="0"/>
               <a:t> edges that contain information about the flow between counties and between states.</a:t>
             </a:r>
-            <a:br>
-              <a:rPr lang="en-US" sz="3200" dirty="0"/>
-            </a:br>
-            <a:endParaRPr lang="en-US" sz="3200" dirty="0"/>
-          </a:p>
-          <a:p>
-            <a:r>
-              <a:rPr lang="en-US" sz="3200" b="1" dirty="0"/>
-              <a:t>Community mobility reports: </a:t>
-            </a:r>
-            <a:r>
-              <a:rPr lang="en-US" sz="3200" dirty="0"/>
-              <a:t>trends at various categories of places aggregated at the county (node) level. </a:t>
-            </a:r>
-          </a:p>
-          <a:p>
-            <a:pPr lvl="1"/>
             <a:endParaRPr lang="en-US" sz="2800" dirty="0">
               <a:solidFill>
                 <a:srgbClr val="FF0000"/>

</xml_diff>